<commit_message>
added a couple of demos
</commit_message>
<xml_diff>
--- a/raven_nancy_slides.pptx
+++ b/raven_nancy_slides.pptx
@@ -6,7 +6,7 @@
     <p:sldMasterId id="2147483744" r:id="rId2"/>
   </p:sldMasterIdLst>
   <p:notesMasterIdLst>
-    <p:notesMasterId r:id="rId21"/>
+    <p:notesMasterId r:id="rId25"/>
   </p:notesMasterIdLst>
   <p:sldIdLst>
     <p:sldId id="273" r:id="rId3"/>
@@ -21,12 +21,16 @@
     <p:sldId id="269" r:id="rId12"/>
     <p:sldId id="270" r:id="rId13"/>
     <p:sldId id="271" r:id="rId14"/>
-    <p:sldId id="272" r:id="rId15"/>
-    <p:sldId id="262" r:id="rId16"/>
-    <p:sldId id="263" r:id="rId17"/>
-    <p:sldId id="266" r:id="rId18"/>
-    <p:sldId id="264" r:id="rId19"/>
-    <p:sldId id="265" r:id="rId20"/>
+    <p:sldId id="276" r:id="rId15"/>
+    <p:sldId id="272" r:id="rId16"/>
+    <p:sldId id="262" r:id="rId17"/>
+    <p:sldId id="263" r:id="rId18"/>
+    <p:sldId id="266" r:id="rId19"/>
+    <p:sldId id="264" r:id="rId20"/>
+    <p:sldId id="265" r:id="rId21"/>
+    <p:sldId id="277" r:id="rId22"/>
+    <p:sldId id="275" r:id="rId23"/>
+    <p:sldId id="274" r:id="rId24"/>
   </p:sldIdLst>
   <p:sldSz cx="9144000" cy="6858000" type="screen4x3"/>
   <p:notesSz cx="6858000" cy="9144000"/>
@@ -543,7 +547,7 @@
           <a:p>
             <a:fld id="{437B0A2B-24B4-470C-B6D7-7A11D8AA68BF}" type="slidenum">
               <a:rPr lang="en-US" smtClean="0"/>
-              <a:t>16</a:t>
+              <a:t>17</a:t>
             </a:fld>
             <a:endParaRPr lang="en-US"/>
           </a:p>
@@ -7281,6 +7285,13 @@
   <p:clrMapOvr>
     <a:masterClrMapping/>
   </p:clrMapOvr>
+  <p:timing>
+    <p:tnLst>
+      <p:par>
+        <p:cTn id="1" dur="indefinite" restart="never" nodeType="tmRoot"/>
+      </p:par>
+    </p:tnLst>
+  </p:timing>
 </p:sld>
 </file>
 
@@ -8196,6 +8207,183 @@
           <a:p>
             <a:r>
               <a:rPr lang="en-US" dirty="0" smtClean="0"/>
+              <a:t>RESTful Architecture</a:t>
+            </a:r>
+            <a:endParaRPr lang="en-US" dirty="0"/>
+          </a:p>
+        </p:txBody>
+      </p:sp>
+      <p:sp>
+        <p:nvSpPr>
+          <p:cNvPr id="3" name="Content Placeholder 2"/>
+          <p:cNvSpPr>
+            <a:spLocks noGrp="1"/>
+          </p:cNvSpPr>
+          <p:nvPr>
+            <p:ph idx="1"/>
+          </p:nvPr>
+        </p:nvSpPr>
+        <p:spPr/>
+        <p:txBody>
+          <a:bodyPr/>
+          <a:lstStyle/>
+          <a:p>
+            <a:r>
+              <a:rPr lang="en-US" dirty="0"/>
+              <a:t>Documents - </a:t>
+            </a:r>
+            <a:r>
+              <a:rPr lang="en-US" sz="2400" dirty="0">
+                <a:hlinkClick r:id="rId2"/>
+              </a:rPr>
+              <a:t>http://</a:t>
+            </a:r>
+            <a:r>
+              <a:rPr lang="en-US" sz="2400" dirty="0" smtClean="0">
+                <a:hlinkClick r:id="rId2"/>
+              </a:rPr>
+              <a:t>localhost:8080/docs</a:t>
+            </a:r>
+            <a:r>
+              <a:rPr lang="en-US" sz="2400" dirty="0">
+                <a:hlinkClick r:id="rId2"/>
+              </a:rPr>
+              <a:t>/{document_id</a:t>
+            </a:r>
+            <a:r>
+              <a:rPr lang="en-US" sz="2400" dirty="0" smtClean="0">
+                <a:hlinkClick r:id="rId2"/>
+              </a:rPr>
+              <a:t>}</a:t>
+            </a:r>
+            <a:endParaRPr lang="en-US" sz="2400" dirty="0" smtClean="0"/>
+          </a:p>
+          <a:p>
+            <a:endParaRPr lang="en-US" dirty="0"/>
+          </a:p>
+          <a:p>
+            <a:r>
+              <a:rPr lang="en-US" dirty="0" smtClean="0"/>
+              <a:t>Attachments -</a:t>
+            </a:r>
+            <a:r>
+              <a:rPr lang="en-US" sz="2400" dirty="0" smtClean="0">
+                <a:hlinkClick r:id="rId3"/>
+              </a:rPr>
+              <a:t>http</a:t>
+            </a:r>
+            <a:r>
+              <a:rPr lang="en-US" sz="2400" dirty="0">
+                <a:hlinkClick r:id="rId3"/>
+              </a:rPr>
+              <a:t>://localhost:8080/static/{attachment_path</a:t>
+            </a:r>
+            <a:r>
+              <a:rPr lang="en-US" sz="2400" dirty="0" smtClean="0">
+                <a:hlinkClick r:id="rId3"/>
+              </a:rPr>
+              <a:t>}</a:t>
+            </a:r>
+            <a:endParaRPr lang="en-US" sz="2400" dirty="0" smtClean="0"/>
+          </a:p>
+          <a:p>
+            <a:pPr marL="137160" indent="0">
+              <a:buNone/>
+            </a:pPr>
+            <a:endParaRPr lang="en-US" dirty="0" smtClean="0"/>
+          </a:p>
+          <a:p>
+            <a:r>
+              <a:rPr lang="en-US" dirty="0"/>
+              <a:t>Index </a:t>
+            </a:r>
+            <a:r>
+              <a:rPr lang="en-US" dirty="0" smtClean="0"/>
+              <a:t>– </a:t>
+            </a:r>
+          </a:p>
+          <a:p>
+            <a:pPr marL="137160" indent="0">
+              <a:buNone/>
+            </a:pPr>
+            <a:r>
+              <a:rPr lang="en-US" sz="2400" dirty="0" smtClean="0"/>
+              <a:t>      http://</a:t>
+            </a:r>
+            <a:r>
+              <a:rPr lang="en-US" sz="2400" dirty="0"/>
+              <a:t>localhost:8080/indexes/{index_id} </a:t>
+            </a:r>
+            <a:endParaRPr lang="en-US" sz="2400" dirty="0" smtClean="0"/>
+          </a:p>
+          <a:p>
+            <a:pPr marL="137160" indent="0">
+              <a:buNone/>
+            </a:pPr>
+            <a:endParaRPr lang="en-US" dirty="0"/>
+          </a:p>
+          <a:p>
+            <a:pPr marL="137160" indent="0">
+              <a:buNone/>
+            </a:pPr>
+            <a:endParaRPr lang="en-US" dirty="0"/>
+          </a:p>
+        </p:txBody>
+      </p:sp>
+    </p:spTree>
+    <p:extLst>
+      <p:ext uri="{BB962C8B-B14F-4D97-AF65-F5344CB8AC3E}">
+        <p14:creationId xmlns:p14="http://schemas.microsoft.com/office/powerpoint/2010/main" val="3867865988"/>
+      </p:ext>
+    </p:extLst>
+  </p:cSld>
+  <p:clrMapOvr>
+    <a:masterClrMapping/>
+  </p:clrMapOvr>
+  <p:timing>
+    <p:tnLst>
+      <p:par>
+        <p:cTn id="1" dur="indefinite" restart="never" nodeType="tmRoot"/>
+      </p:par>
+    </p:tnLst>
+  </p:timing>
+</p:sld>
+</file>
+
+<file path=ppt/slides/slide14.xml><?xml version="1.0" encoding="utf-8"?>
+<p:sld xmlns:a="http://schemas.openxmlformats.org/drawingml/2006/main" xmlns:r="http://schemas.openxmlformats.org/officeDocument/2006/relationships" xmlns:p="http://schemas.openxmlformats.org/presentationml/2006/main">
+  <p:cSld>
+    <p:spTree>
+      <p:nvGrpSpPr>
+        <p:cNvPr id="1" name=""/>
+        <p:cNvGrpSpPr/>
+        <p:nvPr/>
+      </p:nvGrpSpPr>
+      <p:grpSpPr>
+        <a:xfrm>
+          <a:off x="0" y="0"/>
+          <a:ext cx="0" cy="0"/>
+          <a:chOff x="0" y="0"/>
+          <a:chExt cx="0" cy="0"/>
+        </a:xfrm>
+      </p:grpSpPr>
+      <p:sp>
+        <p:nvSpPr>
+          <p:cNvPr id="2" name="Title 1"/>
+          <p:cNvSpPr>
+            <a:spLocks noGrp="1"/>
+          </p:cNvSpPr>
+          <p:nvPr>
+            <p:ph type="title"/>
+          </p:nvPr>
+        </p:nvSpPr>
+        <p:spPr/>
+        <p:txBody>
+          <a:bodyPr/>
+          <a:lstStyle/>
+          <a:p>
+            <a:r>
+              <a:rPr lang="en-US" dirty="0" smtClean="0"/>
               <a:t>The API</a:t>
             </a:r>
             <a:endParaRPr lang="en-US" dirty="0"/>
@@ -8488,7 +8676,7 @@
 </p:sld>
 </file>
 
-<file path=ppt/slides/slide14.xml><?xml version="1.0" encoding="utf-8"?>
+<file path=ppt/slides/slide15.xml><?xml version="1.0" encoding="utf-8"?>
 <p:sld xmlns:a="http://schemas.openxmlformats.org/drawingml/2006/main" xmlns:r="http://schemas.openxmlformats.org/officeDocument/2006/relationships" xmlns:p="http://schemas.openxmlformats.org/presentationml/2006/main">
   <p:cSld>
     <p:spTree>
@@ -8607,14 +8795,128 @@
   <p:timing>
     <p:tnLst>
       <p:par>
-        <p:cTn id="1" dur="indefinite" restart="never" nodeType="tmRoot"/>
+        <p:cTn id="1" dur="indefinite" restart="never" nodeType="tmRoot">
+          <p:childTnLst>
+            <p:seq concurrent="1" nextAc="seek">
+              <p:cTn id="2" dur="indefinite" nodeType="mainSeq">
+                <p:childTnLst>
+                  <p:par>
+                    <p:cTn id="3" fill="hold">
+                      <p:stCondLst>
+                        <p:cond delay="indefinite"/>
+                      </p:stCondLst>
+                      <p:childTnLst>
+                        <p:par>
+                          <p:cTn id="4" fill="hold">
+                            <p:stCondLst>
+                              <p:cond delay="0"/>
+                            </p:stCondLst>
+                            <p:childTnLst>
+                              <p:par>
+                                <p:cTn id="5" presetID="10" presetClass="entr" presetSubtype="0" fill="hold" nodeType="clickEffect">
+                                  <p:stCondLst>
+                                    <p:cond delay="0"/>
+                                  </p:stCondLst>
+                                  <p:childTnLst>
+                                    <p:set>
+                                      <p:cBhvr>
+                                        <p:cTn id="6" dur="1" fill="hold">
+                                          <p:stCondLst>
+                                            <p:cond delay="0"/>
+                                          </p:stCondLst>
+                                        </p:cTn>
+                                        <p:tgtEl>
+                                          <p:spTgt spid="6"/>
+                                        </p:tgtEl>
+                                        <p:attrNameLst>
+                                          <p:attrName>style.visibility</p:attrName>
+                                        </p:attrNameLst>
+                                      </p:cBhvr>
+                                      <p:to>
+                                        <p:strVal val="visible"/>
+                                      </p:to>
+                                    </p:set>
+                                    <p:animEffect transition="in" filter="fade">
+                                      <p:cBhvr>
+                                        <p:cTn id="7" dur="500"/>
+                                        <p:tgtEl>
+                                          <p:spTgt spid="6"/>
+                                        </p:tgtEl>
+                                      </p:cBhvr>
+                                    </p:animEffect>
+                                  </p:childTnLst>
+                                </p:cTn>
+                              </p:par>
+                              <p:par>
+                                <p:cTn id="8" presetID="10" presetClass="entr" presetSubtype="0" fill="hold" grpId="0" nodeType="withEffect">
+                                  <p:stCondLst>
+                                    <p:cond delay="0"/>
+                                  </p:stCondLst>
+                                  <p:childTnLst>
+                                    <p:set>
+                                      <p:cBhvr>
+                                        <p:cTn id="9" dur="1" fill="hold">
+                                          <p:stCondLst>
+                                            <p:cond delay="0"/>
+                                          </p:stCondLst>
+                                        </p:cTn>
+                                        <p:tgtEl>
+                                          <p:spTgt spid="7"/>
+                                        </p:tgtEl>
+                                        <p:attrNameLst>
+                                          <p:attrName>style.visibility</p:attrName>
+                                        </p:attrNameLst>
+                                      </p:cBhvr>
+                                      <p:to>
+                                        <p:strVal val="visible"/>
+                                      </p:to>
+                                    </p:set>
+                                    <p:animEffect transition="in" filter="fade">
+                                      <p:cBhvr>
+                                        <p:cTn id="10" dur="500"/>
+                                        <p:tgtEl>
+                                          <p:spTgt spid="7"/>
+                                        </p:tgtEl>
+                                      </p:cBhvr>
+                                    </p:animEffect>
+                                  </p:childTnLst>
+                                </p:cTn>
+                              </p:par>
+                            </p:childTnLst>
+                          </p:cTn>
+                        </p:par>
+                      </p:childTnLst>
+                    </p:cTn>
+                  </p:par>
+                </p:childTnLst>
+              </p:cTn>
+              <p:prevCondLst>
+                <p:cond evt="onPrev" delay="0">
+                  <p:tgtEl>
+                    <p:sldTgt/>
+                  </p:tgtEl>
+                </p:cond>
+              </p:prevCondLst>
+              <p:nextCondLst>
+                <p:cond evt="onNext" delay="0">
+                  <p:tgtEl>
+                    <p:sldTgt/>
+                  </p:tgtEl>
+                </p:cond>
+              </p:nextCondLst>
+            </p:seq>
+          </p:childTnLst>
+        </p:cTn>
       </p:par>
     </p:tnLst>
+    <p:bldLst>
+      <p:bldP spid="7" grpId="0"/>
+    </p:bldLst>
   </p:timing>
 </p:sld>
 </file>
 
-<file path=ppt/slides/slide15.xml><?xml version="1.0" encoding="utf-8"?>
+<file path=ppt/slides/slide16.xml><?xml version="1.0" encoding="utf-8"?>
 <p:sld xmlns:a="http://schemas.openxmlformats.org/drawingml/2006/main" xmlns:r="http://schemas.openxmlformats.org/officeDocument/2006/relationships" xmlns:p="http://schemas.openxmlformats.org/presentationml/2006/main">
   <p:cSld>
     <p:spTree>
@@ -8655,7 +8957,7 @@
           <a:p>
             <a:r>
               <a:rPr lang="en-US" dirty="0" smtClean="0"/>
-              <a:t>NancyFX, </a:t>
+              <a:t>NancyFX </a:t>
             </a:r>
             <a:br>
               <a:rPr lang="en-US" dirty="0" smtClean="0"/>
@@ -8826,14 +9128,128 @@
   <p:timing>
     <p:tnLst>
       <p:par>
-        <p:cTn id="1" dur="indefinite" restart="never" nodeType="tmRoot"/>
+        <p:cTn id="1" dur="indefinite" restart="never" nodeType="tmRoot">
+          <p:childTnLst>
+            <p:seq concurrent="1" nextAc="seek">
+              <p:cTn id="2" dur="indefinite" nodeType="mainSeq">
+                <p:childTnLst>
+                  <p:par>
+                    <p:cTn id="3" fill="hold">
+                      <p:stCondLst>
+                        <p:cond delay="indefinite"/>
+                      </p:stCondLst>
+                      <p:childTnLst>
+                        <p:par>
+                          <p:cTn id="4" fill="hold">
+                            <p:stCondLst>
+                              <p:cond delay="0"/>
+                            </p:stCondLst>
+                            <p:childTnLst>
+                              <p:par>
+                                <p:cTn id="5" presetID="10" presetClass="entr" presetSubtype="0" fill="hold" grpId="0" nodeType="clickEffect">
+                                  <p:stCondLst>
+                                    <p:cond delay="0"/>
+                                  </p:stCondLst>
+                                  <p:childTnLst>
+                                    <p:set>
+                                      <p:cBhvr>
+                                        <p:cTn id="6" dur="1" fill="hold">
+                                          <p:stCondLst>
+                                            <p:cond delay="0"/>
+                                          </p:stCondLst>
+                                        </p:cTn>
+                                        <p:tgtEl>
+                                          <p:spTgt spid="4"/>
+                                        </p:tgtEl>
+                                        <p:attrNameLst>
+                                          <p:attrName>style.visibility</p:attrName>
+                                        </p:attrNameLst>
+                                      </p:cBhvr>
+                                      <p:to>
+                                        <p:strVal val="visible"/>
+                                      </p:to>
+                                    </p:set>
+                                    <p:animEffect transition="in" filter="fade">
+                                      <p:cBhvr>
+                                        <p:cTn id="7" dur="500"/>
+                                        <p:tgtEl>
+                                          <p:spTgt spid="4"/>
+                                        </p:tgtEl>
+                                      </p:cBhvr>
+                                    </p:animEffect>
+                                  </p:childTnLst>
+                                </p:cTn>
+                              </p:par>
+                              <p:par>
+                                <p:cTn id="8" presetID="10" presetClass="entr" presetSubtype="0" fill="hold" nodeType="withEffect">
+                                  <p:stCondLst>
+                                    <p:cond delay="0"/>
+                                  </p:stCondLst>
+                                  <p:childTnLst>
+                                    <p:set>
+                                      <p:cBhvr>
+                                        <p:cTn id="9" dur="1" fill="hold">
+                                          <p:stCondLst>
+                                            <p:cond delay="0"/>
+                                          </p:stCondLst>
+                                        </p:cTn>
+                                        <p:tgtEl>
+                                          <p:spTgt spid="5"/>
+                                        </p:tgtEl>
+                                        <p:attrNameLst>
+                                          <p:attrName>style.visibility</p:attrName>
+                                        </p:attrNameLst>
+                                      </p:cBhvr>
+                                      <p:to>
+                                        <p:strVal val="visible"/>
+                                      </p:to>
+                                    </p:set>
+                                    <p:animEffect transition="in" filter="fade">
+                                      <p:cBhvr>
+                                        <p:cTn id="10" dur="500"/>
+                                        <p:tgtEl>
+                                          <p:spTgt spid="5"/>
+                                        </p:tgtEl>
+                                      </p:cBhvr>
+                                    </p:animEffect>
+                                  </p:childTnLst>
+                                </p:cTn>
+                              </p:par>
+                            </p:childTnLst>
+                          </p:cTn>
+                        </p:par>
+                      </p:childTnLst>
+                    </p:cTn>
+                  </p:par>
+                </p:childTnLst>
+              </p:cTn>
+              <p:prevCondLst>
+                <p:cond evt="onPrev" delay="0">
+                  <p:tgtEl>
+                    <p:sldTgt/>
+                  </p:tgtEl>
+                </p:cond>
+              </p:prevCondLst>
+              <p:nextCondLst>
+                <p:cond evt="onNext" delay="0">
+                  <p:tgtEl>
+                    <p:sldTgt/>
+                  </p:tgtEl>
+                </p:cond>
+              </p:nextCondLst>
+            </p:seq>
+          </p:childTnLst>
+        </p:cTn>
       </p:par>
     </p:tnLst>
+    <p:bldLst>
+      <p:bldP spid="4" grpId="0" animBg="1"/>
+    </p:bldLst>
   </p:timing>
 </p:sld>
 </file>
 
-<file path=ppt/slides/slide16.xml><?xml version="1.0" encoding="utf-8"?>
+<file path=ppt/slides/slide17.xml><?xml version="1.0" encoding="utf-8"?>
 <p:sld xmlns:a="http://schemas.openxmlformats.org/drawingml/2006/main" xmlns:r="http://schemas.openxmlformats.org/officeDocument/2006/relationships" xmlns:p="http://schemas.openxmlformats.org/presentationml/2006/main">
   <p:cSld>
     <p:spTree>
@@ -9243,7 +9659,7 @@
 </p:sld>
 </file>
 
-<file path=ppt/slides/slide17.xml><?xml version="1.0" encoding="utf-8"?>
+<file path=ppt/slides/slide18.xml><?xml version="1.0" encoding="utf-8"?>
 <p:sld xmlns:a="http://schemas.openxmlformats.org/drawingml/2006/main" xmlns:r="http://schemas.openxmlformats.org/officeDocument/2006/relationships" xmlns:p="http://schemas.openxmlformats.org/presentationml/2006/main">
   <p:cSld>
     <p:spTree>
@@ -9646,7 +10062,7 @@
 </p:sld>
 </file>
 
-<file path=ppt/slides/slide18.xml><?xml version="1.0" encoding="utf-8"?>
+<file path=ppt/slides/slide19.xml><?xml version="1.0" encoding="utf-8"?>
 <p:sld xmlns:a="http://schemas.openxmlformats.org/drawingml/2006/main" xmlns:r="http://schemas.openxmlformats.org/officeDocument/2006/relationships" xmlns:p="http://schemas.openxmlformats.org/presentationml/2006/main">
   <p:cSld>
     <p:spTree>
@@ -10190,6 +10606,301 @@
 </p:sld>
 </file>
 
+<file path=ppt/slides/slide20.xml><?xml version="1.0" encoding="utf-8"?>
+<p:sld xmlns:a="http://schemas.openxmlformats.org/drawingml/2006/main" xmlns:r="http://schemas.openxmlformats.org/officeDocument/2006/relationships" xmlns:p="http://schemas.openxmlformats.org/presentationml/2006/main">
+  <p:cSld>
+    <p:spTree>
+      <p:nvGrpSpPr>
+        <p:cNvPr id="1" name=""/>
+        <p:cNvGrpSpPr/>
+        <p:nvPr/>
+      </p:nvGrpSpPr>
+      <p:grpSpPr>
+        <a:xfrm>
+          <a:off x="0" y="0"/>
+          <a:ext cx="0" cy="0"/>
+          <a:chOff x="0" y="0"/>
+          <a:chExt cx="0" cy="0"/>
+        </a:xfrm>
+      </p:grpSpPr>
+      <p:sp>
+        <p:nvSpPr>
+          <p:cNvPr id="2" name="Title 1"/>
+          <p:cNvSpPr>
+            <a:spLocks noGrp="1"/>
+          </p:cNvSpPr>
+          <p:nvPr>
+            <p:ph type="title"/>
+          </p:nvPr>
+        </p:nvSpPr>
+        <p:spPr/>
+        <p:txBody>
+          <a:bodyPr/>
+          <a:lstStyle/>
+          <a:p>
+            <a:r>
+              <a:rPr lang="en-US" dirty="0" smtClean="0"/>
+              <a:t>OWIN</a:t>
+            </a:r>
+            <a:endParaRPr lang="en-US" dirty="0"/>
+          </a:p>
+        </p:txBody>
+      </p:sp>
+      <p:sp>
+        <p:nvSpPr>
+          <p:cNvPr id="5" name="Content Placeholder 4"/>
+          <p:cNvSpPr>
+            <a:spLocks noGrp="1"/>
+          </p:cNvSpPr>
+          <p:nvPr>
+            <p:ph sz="half" idx="1"/>
+          </p:nvPr>
+        </p:nvSpPr>
+        <p:spPr>
+          <a:xfrm>
+            <a:off x="2133600" y="2332037"/>
+            <a:ext cx="4876800" cy="3230563"/>
+          </a:xfrm>
+        </p:spPr>
+        <p:txBody>
+          <a:bodyPr/>
+          <a:lstStyle/>
+          <a:p>
+            <a:pPr>
+              <a:lnSpc>
+                <a:spcPct val="200000"/>
+              </a:lnSpc>
+            </a:pPr>
+            <a:r>
+              <a:rPr lang="en-US" dirty="0" smtClean="0"/>
+              <a:t>Available Kayak, Mono etc..</a:t>
+            </a:r>
+          </a:p>
+          <a:p>
+            <a:pPr>
+              <a:lnSpc>
+                <a:spcPct val="200000"/>
+              </a:lnSpc>
+            </a:pPr>
+            <a:r>
+              <a:rPr lang="en-US" dirty="0" smtClean="0"/>
+              <a:t>Who uses it?</a:t>
+            </a:r>
+          </a:p>
+          <a:p>
+            <a:endParaRPr lang="en-US" dirty="0" smtClean="0"/>
+          </a:p>
+          <a:p>
+            <a:endParaRPr lang="en-US" dirty="0" smtClean="0"/>
+          </a:p>
+        </p:txBody>
+      </p:sp>
+      <p:sp>
+        <p:nvSpPr>
+          <p:cNvPr id="4" name="TextBox 3"/>
+          <p:cNvSpPr txBox="1"/>
+          <p:nvPr/>
+        </p:nvSpPr>
+        <p:spPr>
+          <a:xfrm>
+            <a:off x="1857956" y="1380067"/>
+            <a:ext cx="5428089" cy="584775"/>
+          </a:xfrm>
+          <a:prstGeom prst="rect">
+            <a:avLst/>
+          </a:prstGeom>
+          <a:noFill/>
+        </p:spPr>
+        <p:txBody>
+          <a:bodyPr wrap="none" rtlCol="0">
+            <a:spAutoFit/>
+          </a:bodyPr>
+          <a:lstStyle/>
+          <a:p>
+            <a:r>
+              <a:rPr lang="en-US" sz="3200" dirty="0" smtClean="0"/>
+              <a:t>Open Web Interface  for .Net</a:t>
+            </a:r>
+            <a:endParaRPr lang="en-US" sz="3200" dirty="0"/>
+          </a:p>
+        </p:txBody>
+      </p:sp>
+    </p:spTree>
+    <p:extLst>
+      <p:ext uri="{BB962C8B-B14F-4D97-AF65-F5344CB8AC3E}">
+        <p14:creationId xmlns:p14="http://schemas.microsoft.com/office/powerpoint/2010/main" val="3115513265"/>
+      </p:ext>
+    </p:extLst>
+  </p:cSld>
+  <p:clrMapOvr>
+    <a:masterClrMapping/>
+  </p:clrMapOvr>
+  <p:timing>
+    <p:tnLst>
+      <p:par>
+        <p:cTn id="1" dur="indefinite" restart="never" nodeType="tmRoot"/>
+      </p:par>
+    </p:tnLst>
+  </p:timing>
+</p:sld>
+</file>
+
+<file path=ppt/slides/slide21.xml><?xml version="1.0" encoding="utf-8"?>
+<p:sld xmlns:a="http://schemas.openxmlformats.org/drawingml/2006/main" xmlns:r="http://schemas.openxmlformats.org/officeDocument/2006/relationships" xmlns:p="http://schemas.openxmlformats.org/presentationml/2006/main">
+  <p:cSld>
+    <p:spTree>
+      <p:nvGrpSpPr>
+        <p:cNvPr id="1" name=""/>
+        <p:cNvGrpSpPr/>
+        <p:nvPr/>
+      </p:nvGrpSpPr>
+      <p:grpSpPr>
+        <a:xfrm>
+          <a:off x="0" y="0"/>
+          <a:ext cx="0" cy="0"/>
+          <a:chOff x="0" y="0"/>
+          <a:chExt cx="0" cy="0"/>
+        </a:xfrm>
+      </p:grpSpPr>
+      <p:sp>
+        <p:nvSpPr>
+          <p:cNvPr id="2" name="Title 1"/>
+          <p:cNvSpPr>
+            <a:spLocks noGrp="1"/>
+          </p:cNvSpPr>
+          <p:nvPr>
+            <p:ph type="ctrTitle"/>
+          </p:nvPr>
+        </p:nvSpPr>
+        <p:spPr/>
+        <p:txBody>
+          <a:bodyPr/>
+          <a:lstStyle/>
+          <a:p>
+            <a:r>
+              <a:rPr lang="en-US" dirty="0" smtClean="0"/>
+              <a:t>Bringing it together</a:t>
+            </a:r>
+            <a:endParaRPr lang="en-US" dirty="0"/>
+          </a:p>
+        </p:txBody>
+      </p:sp>
+    </p:spTree>
+    <p:extLst>
+      <p:ext uri="{BB962C8B-B14F-4D97-AF65-F5344CB8AC3E}">
+        <p14:creationId xmlns:p14="http://schemas.microsoft.com/office/powerpoint/2010/main" val="638396341"/>
+      </p:ext>
+    </p:extLst>
+  </p:cSld>
+  <p:clrMapOvr>
+    <a:masterClrMapping/>
+  </p:clrMapOvr>
+  <p:timing>
+    <p:tnLst>
+      <p:par>
+        <p:cTn id="1" dur="indefinite" restart="never" nodeType="tmRoot"/>
+      </p:par>
+    </p:tnLst>
+  </p:timing>
+</p:sld>
+</file>
+
+<file path=ppt/slides/slide22.xml><?xml version="1.0" encoding="utf-8"?>
+<p:sld xmlns:a="http://schemas.openxmlformats.org/drawingml/2006/main" xmlns:r="http://schemas.openxmlformats.org/officeDocument/2006/relationships" xmlns:p="http://schemas.openxmlformats.org/presentationml/2006/main">
+  <p:cSld>
+    <p:spTree>
+      <p:nvGrpSpPr>
+        <p:cNvPr id="1" name=""/>
+        <p:cNvGrpSpPr/>
+        <p:nvPr/>
+      </p:nvGrpSpPr>
+      <p:grpSpPr>
+        <a:xfrm>
+          <a:off x="0" y="0"/>
+          <a:ext cx="0" cy="0"/>
+          <a:chOff x="0" y="0"/>
+          <a:chExt cx="0" cy="0"/>
+        </a:xfrm>
+      </p:grpSpPr>
+      <p:sp>
+        <p:nvSpPr>
+          <p:cNvPr id="2" name="Title 1"/>
+          <p:cNvSpPr>
+            <a:spLocks noGrp="1"/>
+          </p:cNvSpPr>
+          <p:nvPr>
+            <p:ph type="ctrTitle"/>
+          </p:nvPr>
+        </p:nvSpPr>
+        <p:spPr/>
+        <p:txBody>
+          <a:bodyPr>
+            <a:normAutofit/>
+          </a:bodyPr>
+          <a:lstStyle/>
+          <a:p>
+            <a:r>
+              <a:rPr lang="en-US" dirty="0" smtClean="0"/>
+              <a:t>Questions/Comments</a:t>
+            </a:r>
+            <a:endParaRPr lang="en-US" dirty="0"/>
+          </a:p>
+        </p:txBody>
+      </p:sp>
+      <p:sp>
+        <p:nvSpPr>
+          <p:cNvPr id="3" name="Subtitle 2"/>
+          <p:cNvSpPr>
+            <a:spLocks noGrp="1"/>
+          </p:cNvSpPr>
+          <p:nvPr>
+            <p:ph type="subTitle" idx="1"/>
+          </p:nvPr>
+        </p:nvSpPr>
+        <p:spPr/>
+        <p:txBody>
+          <a:bodyPr/>
+          <a:lstStyle/>
+          <a:p>
+            <a:r>
+              <a:rPr lang="en-US" dirty="0" smtClean="0">
+                <a:hlinkClick r:id="rId2"/>
+              </a:rPr>
+              <a:t>Presentation Slide and Samples</a:t>
+            </a:r>
+            <a:endParaRPr lang="en-US" dirty="0" smtClean="0"/>
+          </a:p>
+          <a:p>
+            <a:r>
+              <a:rPr lang="en-US" dirty="0">
+                <a:hlinkClick r:id="rId2"/>
+              </a:rPr>
+              <a:t>https://github.com/justinsoliz/ravendb_nancyfx_presentation</a:t>
+            </a:r>
+            <a:endParaRPr lang="en-US" dirty="0"/>
+          </a:p>
+        </p:txBody>
+      </p:sp>
+    </p:spTree>
+    <p:extLst>
+      <p:ext uri="{BB962C8B-B14F-4D97-AF65-F5344CB8AC3E}">
+        <p14:creationId xmlns:p14="http://schemas.microsoft.com/office/powerpoint/2010/main" val="3342976928"/>
+      </p:ext>
+    </p:extLst>
+  </p:cSld>
+  <p:clrMapOvr>
+    <a:masterClrMapping/>
+  </p:clrMapOvr>
+  <p:timing>
+    <p:tnLst>
+      <p:par>
+        <p:cTn id="1" dur="indefinite" restart="never" nodeType="tmRoot"/>
+      </p:par>
+    </p:tnLst>
+  </p:timing>
+</p:sld>
+</file>
+
 <file path=ppt/slides/slide3.xml><?xml version="1.0" encoding="utf-8"?>
 <p:sld xmlns:a="http://schemas.openxmlformats.org/drawingml/2006/main" xmlns:r="http://schemas.openxmlformats.org/officeDocument/2006/relationships" xmlns:p="http://schemas.openxmlformats.org/presentationml/2006/main">
   <p:cSld>
@@ -10568,7 +11279,7 @@
       </p:grpSpPr>
       <p:pic>
         <p:nvPicPr>
-          <p:cNvPr id="3" name="Picture 2"/>
+          <p:cNvPr id="6" name="Picture 5"/>
           <p:cNvPicPr>
             <a:picLocks noChangeAspect="1"/>
           </p:cNvPicPr>
@@ -10588,17 +11299,47 @@
         </p:blipFill>
         <p:spPr>
           <a:xfrm>
-            <a:off x="2743200" y="304800"/>
-            <a:ext cx="2971800" cy="1981200"/>
+            <a:off x="-13040" y="838200"/>
+            <a:ext cx="9157039" cy="5486400"/>
           </a:xfrm>
           <a:prstGeom prst="rect">
             <a:avLst/>
           </a:prstGeom>
         </p:spPr>
       </p:pic>
+      <p:sp>
+        <p:nvSpPr>
+          <p:cNvPr id="7" name="TextBox 6"/>
+          <p:cNvSpPr txBox="1"/>
+          <p:nvPr/>
+        </p:nvSpPr>
+        <p:spPr>
+          <a:xfrm>
+            <a:off x="7409744" y="6441990"/>
+            <a:ext cx="1353256" cy="369332"/>
+          </a:xfrm>
+          <a:prstGeom prst="rect">
+            <a:avLst/>
+          </a:prstGeom>
+          <a:noFill/>
+        </p:spPr>
+        <p:txBody>
+          <a:bodyPr wrap="none" rtlCol="0">
+            <a:spAutoFit/>
+          </a:bodyPr>
+          <a:lstStyle/>
+          <a:p>
+            <a:r>
+              <a:rPr lang="en-US" dirty="0" smtClean="0"/>
+              <a:t>@jrecursive</a:t>
+            </a:r>
+            <a:endParaRPr lang="en-US" dirty="0"/>
+          </a:p>
+        </p:txBody>
+      </p:sp>
       <p:pic>
         <p:nvPicPr>
-          <p:cNvPr id="6" name="Picture 5"/>
+          <p:cNvPr id="3" name="Picture 2"/>
           <p:cNvPicPr>
             <a:picLocks noChangeAspect="1"/>
           </p:cNvPicPr>
@@ -10618,44 +11359,14 @@
         </p:blipFill>
         <p:spPr>
           <a:xfrm>
-            <a:off x="381000" y="2590800"/>
-            <a:ext cx="8382000" cy="3851190"/>
+            <a:off x="3048000" y="0"/>
+            <a:ext cx="2971800" cy="1981200"/>
           </a:xfrm>
           <a:prstGeom prst="rect">
             <a:avLst/>
           </a:prstGeom>
         </p:spPr>
       </p:pic>
-      <p:sp>
-        <p:nvSpPr>
-          <p:cNvPr id="7" name="TextBox 6"/>
-          <p:cNvSpPr txBox="1"/>
-          <p:nvPr/>
-        </p:nvSpPr>
-        <p:spPr>
-          <a:xfrm>
-            <a:off x="7409744" y="6441990"/>
-            <a:ext cx="1353256" cy="369332"/>
-          </a:xfrm>
-          <a:prstGeom prst="rect">
-            <a:avLst/>
-          </a:prstGeom>
-          <a:noFill/>
-        </p:spPr>
-        <p:txBody>
-          <a:bodyPr wrap="none" rtlCol="0">
-            <a:spAutoFit/>
-          </a:bodyPr>
-          <a:lstStyle/>
-          <a:p>
-            <a:r>
-              <a:rPr lang="en-US" dirty="0" smtClean="0"/>
-              <a:t>@jrecursive</a:t>
-            </a:r>
-            <a:endParaRPr lang="en-US" dirty="0"/>
-          </a:p>
-        </p:txBody>
-      </p:sp>
     </p:spTree>
     <p:extLst>
       <p:ext uri="{BB962C8B-B14F-4D97-AF65-F5344CB8AC3E}">

</xml_diff>